<commit_message>
Added transitions and some minor changes
</commit_message>
<xml_diff>
--- a/Software Engineering ISA II DevOps - S19-412^0S19-205.pptx
+++ b/Software Engineering ISA II DevOps - S19-412^0S19-205.pptx
@@ -110,6 +110,11 @@
       </a:defRPr>
     </a:lvl9pPr>
   </p:defaultTextStyle>
+  <p:extLst>
+    <p:ext uri="{EFAFB233-063F-42B5-8137-9DF3F51BA10A}">
+      <p15:sldGuideLst xmlns:p15="http://schemas.microsoft.com/office/powerpoint/2012/main"/>
+    </p:ext>
+  </p:extLst>
 </p:presentation>
 </file>
 
@@ -3364,7 +3369,12 @@
             <p:ph type="ctrTitle"/>
           </p:nvPr>
         </p:nvSpPr>
-        <p:spPr/>
+        <p:spPr>
+          <a:xfrm>
+            <a:off x="1524000" y="2235200"/>
+            <a:ext cx="9144000" cy="2387600"/>
+          </a:xfrm>
+        </p:spPr>
         <p:txBody>
           <a:bodyPr/>
           <a:lstStyle/>
@@ -3399,12 +3409,51 @@
             <p:ph type="subTitle" idx="1"/>
           </p:nvPr>
         </p:nvSpPr>
-        <p:spPr/>
-        <p:txBody>
-          <a:bodyPr/>
-          <a:lstStyle/>
-          <a:p>
-            <a:endParaRPr lang="en-IN"/>
+        <p:spPr>
+          <a:xfrm>
+            <a:off x="10105293" y="5693899"/>
+            <a:ext cx="2086707" cy="1164101"/>
+          </a:xfrm>
+        </p:spPr>
+        <p:txBody>
+          <a:bodyPr>
+            <a:normAutofit fontScale="92500"/>
+          </a:bodyPr>
+          <a:lstStyle/>
+          <a:p>
+            <a:r>
+              <a:rPr lang="en-US" dirty="0">
+                <a:latin typeface="Times New Roman" panose="02020603050405020304" pitchFamily="18" charset="0"/>
+                <a:cs typeface="Times New Roman" panose="02020603050405020304" pitchFamily="18" charset="0"/>
+              </a:rPr>
+              <a:t>Roll Number(s):</a:t>
+            </a:r>
+          </a:p>
+          <a:p>
+            <a:r>
+              <a:rPr lang="en-US" dirty="0">
+                <a:latin typeface="Times New Roman" panose="02020603050405020304" pitchFamily="18" charset="0"/>
+                <a:cs typeface="Times New Roman" panose="02020603050405020304" pitchFamily="18" charset="0"/>
+              </a:rPr>
+              <a:t>S19-412</a:t>
+            </a:r>
+            <a:br>
+              <a:rPr lang="en-US" dirty="0">
+                <a:latin typeface="Times New Roman" panose="02020603050405020304" pitchFamily="18" charset="0"/>
+                <a:cs typeface="Times New Roman" panose="02020603050405020304" pitchFamily="18" charset="0"/>
+              </a:rPr>
+            </a:br>
+            <a:r>
+              <a:rPr lang="en-US" dirty="0">
+                <a:latin typeface="Times New Roman" panose="02020603050405020304" pitchFamily="18" charset="0"/>
+                <a:cs typeface="Times New Roman" panose="02020603050405020304" pitchFamily="18" charset="0"/>
+              </a:rPr>
+              <a:t>S19-205</a:t>
+            </a:r>
+            <a:endParaRPr lang="en-IN" dirty="0">
+              <a:latin typeface="Times New Roman" panose="02020603050405020304" pitchFamily="18" charset="0"/>
+              <a:cs typeface="Times New Roman" panose="02020603050405020304" pitchFamily="18" charset="0"/>
+            </a:endParaRPr>
           </a:p>
         </p:txBody>
       </p:sp>
@@ -3418,6 +3467,18 @@
   <p:clrMapOvr>
     <a:masterClrMapping/>
   </p:clrMapOvr>
+  <mc:AlternateContent xmlns:mc="http://schemas.openxmlformats.org/markup-compatibility/2006" xmlns:p14="http://schemas.microsoft.com/office/powerpoint/2010/main">
+    <mc:Choice Requires="p14">
+      <p:transition spd="med" p14:dur="700">
+        <p:fade/>
+      </p:transition>
+    </mc:Choice>
+    <mc:Fallback xmlns="">
+      <p:transition spd="med">
+        <p:fade/>
+      </p:transition>
+    </mc:Fallback>
+  </mc:AlternateContent>
 </p:sld>
 </file>
 
@@ -3491,7 +3552,7 @@
         </p:nvSpPr>
         <p:spPr>
           <a:xfrm>
-            <a:off x="838200" y="5244074"/>
+            <a:off x="838200" y="5215938"/>
             <a:ext cx="10515600" cy="4351338"/>
           </a:xfrm>
         </p:spPr>
@@ -3505,7 +3566,55 @@
                 <a:latin typeface="Times New Roman" panose="02020603050405020304" pitchFamily="18" charset="0"/>
                 <a:cs typeface="Times New Roman" panose="02020603050405020304" pitchFamily="18" charset="0"/>
               </a:rPr>
-              <a:t>The word DevOps is a combination of the terms development and operations, meant to represent a collaborative or shared approach to the tasks performed by a company's application development and IT operations teams.</a:t>
+              <a:t>The word </a:t>
+            </a:r>
+            <a:r>
+              <a:rPr lang="en-US" b="0" i="1" dirty="0">
+                <a:effectLst/>
+                <a:latin typeface="Times New Roman" panose="02020603050405020304" pitchFamily="18" charset="0"/>
+                <a:cs typeface="Times New Roman" panose="02020603050405020304" pitchFamily="18" charset="0"/>
+              </a:rPr>
+              <a:t>DevOps</a:t>
+            </a:r>
+            <a:r>
+              <a:rPr lang="en-US" b="0" i="0" dirty="0">
+                <a:effectLst/>
+                <a:latin typeface="Times New Roman" panose="02020603050405020304" pitchFamily="18" charset="0"/>
+                <a:cs typeface="Times New Roman" panose="02020603050405020304" pitchFamily="18" charset="0"/>
+              </a:rPr>
+              <a:t> is a combination of the terms </a:t>
+            </a:r>
+            <a:r>
+              <a:rPr lang="en-US" b="0" i="1" dirty="0">
+                <a:effectLst/>
+                <a:latin typeface="Times New Roman" panose="02020603050405020304" pitchFamily="18" charset="0"/>
+                <a:cs typeface="Times New Roman" panose="02020603050405020304" pitchFamily="18" charset="0"/>
+              </a:rPr>
+              <a:t>development</a:t>
+            </a:r>
+            <a:r>
+              <a:rPr lang="en-US" b="0" i="0" dirty="0">
+                <a:effectLst/>
+                <a:latin typeface="Times New Roman" panose="02020603050405020304" pitchFamily="18" charset="0"/>
+                <a:cs typeface="Times New Roman" panose="02020603050405020304" pitchFamily="18" charset="0"/>
+              </a:rPr>
+              <a:t> and </a:t>
+            </a:r>
+            <a:r>
+              <a:rPr lang="en-US" b="0" i="1" dirty="0">
+                <a:effectLst/>
+                <a:latin typeface="Times New Roman" panose="02020603050405020304" pitchFamily="18" charset="0"/>
+                <a:cs typeface="Times New Roman" panose="02020603050405020304" pitchFamily="18" charset="0"/>
+              </a:rPr>
+              <a:t>operations</a:t>
+            </a:r>
+            <a:r>
+              <a:rPr lang="en-US" b="0" i="0" dirty="0">
+                <a:effectLst/>
+                <a:latin typeface="Times New Roman" panose="02020603050405020304" pitchFamily="18" charset="0"/>
+                <a:cs typeface="Times New Roman" panose="02020603050405020304" pitchFamily="18" charset="0"/>
+              </a:rPr>
+              <a:t>, meant to represent a collaborative or shared approach to the tasks performed by a company's application development and IT operations teams.</a:t>
             </a:r>
             <a:endParaRPr lang="en-IN" dirty="0">
               <a:latin typeface="Times New Roman" panose="02020603050405020304" pitchFamily="18" charset="0"/>
@@ -3545,7 +3654,7 @@
         </p:blipFill>
         <p:spPr>
           <a:xfrm>
-            <a:off x="4182794" y="1592212"/>
+            <a:off x="4182794" y="1493738"/>
             <a:ext cx="3826412" cy="3632102"/>
           </a:xfrm>
           <a:prstGeom prst="rect">
@@ -3563,6 +3672,18 @@
   <p:clrMapOvr>
     <a:masterClrMapping/>
   </p:clrMapOvr>
+  <mc:AlternateContent xmlns:mc="http://schemas.openxmlformats.org/markup-compatibility/2006" xmlns:p14="http://schemas.microsoft.com/office/powerpoint/2010/main">
+    <mc:Choice Requires="p14">
+      <p:transition spd="med" p14:dur="700">
+        <p:fade/>
+      </p:transition>
+    </mc:Choice>
+    <mc:Fallback xmlns="">
+      <p:transition spd="med">
+        <p:fade/>
+      </p:transition>
+    </mc:Fallback>
+  </mc:AlternateContent>
 </p:sld>
 </file>
 
@@ -3585,31 +3706,6 @@
       </p:grpSpPr>
       <p:sp>
         <p:nvSpPr>
-          <p:cNvPr id="2" name="Title 1">
-            <a:extLst>
-              <a:ext uri="{FF2B5EF4-FFF2-40B4-BE49-F238E27FC236}">
-                <a16:creationId xmlns:a16="http://schemas.microsoft.com/office/drawing/2014/main" id="{51912FC4-C7BF-45BB-AC89-F0C00E5E5316}"/>
-              </a:ext>
-            </a:extLst>
-          </p:cNvPr>
-          <p:cNvSpPr>
-            <a:spLocks noGrp="1"/>
-          </p:cNvSpPr>
-          <p:nvPr>
-            <p:ph type="title"/>
-          </p:nvPr>
-        </p:nvSpPr>
-        <p:spPr/>
-        <p:txBody>
-          <a:bodyPr/>
-          <a:lstStyle/>
-          <a:p>
-            <a:endParaRPr lang="en-IN"/>
-          </a:p>
-        </p:txBody>
-      </p:sp>
-      <p:sp>
-        <p:nvSpPr>
           <p:cNvPr id="3" name="Content Placeholder 2">
             <a:extLst>
               <a:ext uri="{FF2B5EF4-FFF2-40B4-BE49-F238E27FC236}">
@@ -3624,7 +3720,12 @@
             <p:ph idx="1"/>
           </p:nvPr>
         </p:nvSpPr>
-        <p:spPr/>
+        <p:spPr>
+          <a:xfrm>
+            <a:off x="838200" y="1253331"/>
+            <a:ext cx="10515600" cy="4351338"/>
+          </a:xfrm>
+        </p:spPr>
         <p:txBody>
           <a:bodyPr/>
           <a:lstStyle/>
@@ -3671,6 +3772,18 @@
   <p:clrMapOvr>
     <a:masterClrMapping/>
   </p:clrMapOvr>
+  <mc:AlternateContent xmlns:mc="http://schemas.openxmlformats.org/markup-compatibility/2006" xmlns:p14="http://schemas.microsoft.com/office/powerpoint/2010/main">
+    <mc:Choice Requires="p14">
+      <p:transition spd="med" p14:dur="700">
+        <p:fade/>
+      </p:transition>
+    </mc:Choice>
+    <mc:Fallback xmlns="">
+      <p:transition spd="med">
+        <p:fade/>
+      </p:transition>
+    </mc:Fallback>
+  </mc:AlternateContent>
 </p:sld>
 </file>
 
@@ -3707,7 +3820,12 @@
             <p:ph type="title"/>
           </p:nvPr>
         </p:nvSpPr>
-        <p:spPr/>
+        <p:spPr>
+          <a:xfrm>
+            <a:off x="838200" y="421395"/>
+            <a:ext cx="10515600" cy="1325563"/>
+          </a:xfrm>
+        </p:spPr>
         <p:txBody>
           <a:bodyPr>
             <a:normAutofit fontScale="90000"/>
@@ -3746,7 +3864,7 @@
         </p:nvSpPr>
         <p:spPr>
           <a:xfrm>
-            <a:off x="838200" y="2346129"/>
+            <a:off x="838200" y="2085267"/>
             <a:ext cx="10515600" cy="4351338"/>
           </a:xfrm>
         </p:spPr>
@@ -3891,6 +4009,18 @@
   <p:clrMapOvr>
     <a:masterClrMapping/>
   </p:clrMapOvr>
+  <mc:AlternateContent xmlns:mc="http://schemas.openxmlformats.org/markup-compatibility/2006" xmlns:p14="http://schemas.microsoft.com/office/powerpoint/2010/main">
+    <mc:Choice Requires="p14">
+      <p:transition spd="med" p14:dur="700">
+        <p:fade/>
+      </p:transition>
+    </mc:Choice>
+    <mc:Fallback xmlns="">
+      <p:transition spd="med">
+        <p:fade/>
+      </p:transition>
+    </mc:Fallback>
+  </mc:AlternateContent>
 </p:sld>
 </file>
 
@@ -3975,8 +4105,8 @@
         </p:blipFill>
         <p:spPr>
           <a:xfrm>
-            <a:off x="4257089" y="1450719"/>
-            <a:ext cx="3676650" cy="1781175"/>
+            <a:off x="3649357" y="1782446"/>
+            <a:ext cx="4893286" cy="2370582"/>
           </a:xfrm>
         </p:spPr>
       </p:pic>
@@ -3994,7 +4124,7 @@
         </p:nvSpPr>
         <p:spPr>
           <a:xfrm>
-            <a:off x="839372" y="4104249"/>
+            <a:off x="839372" y="4317488"/>
             <a:ext cx="10514428" cy="1815882"/>
           </a:xfrm>
           <a:prstGeom prst="rect">
@@ -4042,6 +4172,18 @@
   <p:clrMapOvr>
     <a:masterClrMapping/>
   </p:clrMapOvr>
+  <mc:AlternateContent xmlns:mc="http://schemas.openxmlformats.org/markup-compatibility/2006" xmlns:p14="http://schemas.microsoft.com/office/powerpoint/2010/main">
+    <mc:Choice Requires="p14">
+      <p:transition spd="med" p14:dur="700">
+        <p:fade/>
+      </p:transition>
+    </mc:Choice>
+    <mc:Fallback xmlns="">
+      <p:transition spd="med">
+        <p:fade/>
+      </p:transition>
+    </mc:Fallback>
+  </mc:AlternateContent>
 </p:sld>
 </file>
 
@@ -4064,31 +4206,6 @@
       </p:grpSpPr>
       <p:sp>
         <p:nvSpPr>
-          <p:cNvPr id="2" name="Title 1">
-            <a:extLst>
-              <a:ext uri="{FF2B5EF4-FFF2-40B4-BE49-F238E27FC236}">
-                <a16:creationId xmlns:a16="http://schemas.microsoft.com/office/drawing/2014/main" id="{F64FE2C2-2525-444C-A929-EBFD9822D830}"/>
-              </a:ext>
-            </a:extLst>
-          </p:cNvPr>
-          <p:cNvSpPr>
-            <a:spLocks noGrp="1"/>
-          </p:cNvSpPr>
-          <p:nvPr>
-            <p:ph type="title"/>
-          </p:nvPr>
-        </p:nvSpPr>
-        <p:spPr/>
-        <p:txBody>
-          <a:bodyPr/>
-          <a:lstStyle/>
-          <a:p>
-            <a:endParaRPr lang="en-IN"/>
-          </a:p>
-        </p:txBody>
-      </p:sp>
-      <p:sp>
-        <p:nvSpPr>
           <p:cNvPr id="3" name="Content Placeholder 2">
             <a:extLst>
               <a:ext uri="{FF2B5EF4-FFF2-40B4-BE49-F238E27FC236}">
@@ -4103,7 +4220,12 @@
             <p:ph idx="1"/>
           </p:nvPr>
         </p:nvSpPr>
-        <p:spPr/>
+        <p:spPr>
+          <a:xfrm>
+            <a:off x="838200" y="1253331"/>
+            <a:ext cx="10515600" cy="4351338"/>
+          </a:xfrm>
+        </p:spPr>
         <p:txBody>
           <a:bodyPr/>
           <a:lstStyle/>
@@ -4168,6 +4290,18 @@
   <p:clrMapOvr>
     <a:masterClrMapping/>
   </p:clrMapOvr>
+  <mc:AlternateContent xmlns:mc="http://schemas.openxmlformats.org/markup-compatibility/2006" xmlns:p14="http://schemas.microsoft.com/office/powerpoint/2010/main">
+    <mc:Choice Requires="p14">
+      <p:transition spd="med" p14:dur="700">
+        <p:fade/>
+      </p:transition>
+    </mc:Choice>
+    <mc:Fallback xmlns="">
+      <p:transition spd="med">
+        <p:fade/>
+      </p:transition>
+    </mc:Fallback>
+  </mc:AlternateContent>
 </p:sld>
 </file>
 
@@ -4190,31 +4324,6 @@
       </p:grpSpPr>
       <p:sp>
         <p:nvSpPr>
-          <p:cNvPr id="2" name="Title 1">
-            <a:extLst>
-              <a:ext uri="{FF2B5EF4-FFF2-40B4-BE49-F238E27FC236}">
-                <a16:creationId xmlns:a16="http://schemas.microsoft.com/office/drawing/2014/main" id="{C8351D47-4CBB-46A3-956E-5FFDD4DFD9E0}"/>
-              </a:ext>
-            </a:extLst>
-          </p:cNvPr>
-          <p:cNvSpPr>
-            <a:spLocks noGrp="1"/>
-          </p:cNvSpPr>
-          <p:nvPr>
-            <p:ph type="title"/>
-          </p:nvPr>
-        </p:nvSpPr>
-        <p:spPr/>
-        <p:txBody>
-          <a:bodyPr/>
-          <a:lstStyle/>
-          <a:p>
-            <a:endParaRPr lang="en-IN"/>
-          </a:p>
-        </p:txBody>
-      </p:sp>
-      <p:sp>
-        <p:nvSpPr>
           <p:cNvPr id="3" name="Content Placeholder 2">
             <a:extLst>
               <a:ext uri="{FF2B5EF4-FFF2-40B4-BE49-F238E27FC236}">
@@ -4229,7 +4338,12 @@
             <p:ph idx="1"/>
           </p:nvPr>
         </p:nvSpPr>
-        <p:spPr/>
+        <p:spPr>
+          <a:xfrm>
+            <a:off x="838200" y="1253331"/>
+            <a:ext cx="10515600" cy="4351338"/>
+          </a:xfrm>
+        </p:spPr>
         <p:txBody>
           <a:bodyPr/>
           <a:lstStyle/>
@@ -4285,6 +4399,18 @@
   <p:clrMapOvr>
     <a:masterClrMapping/>
   </p:clrMapOvr>
+  <mc:AlternateContent xmlns:mc="http://schemas.openxmlformats.org/markup-compatibility/2006" xmlns:p14="http://schemas.microsoft.com/office/powerpoint/2010/main">
+    <mc:Choice Requires="p14">
+      <p:transition spd="med" p14:dur="700">
+        <p:fade/>
+      </p:transition>
+    </mc:Choice>
+    <mc:Fallback xmlns="">
+      <p:transition spd="med">
+        <p:fade/>
+      </p:transition>
+    </mc:Fallback>
+  </mc:AlternateContent>
 </p:sld>
 </file>
 

</xml_diff>